<commit_message>
updated technologies with vex modals & validation functions
</commit_message>
<xml_diff>
--- a/powerpoint/pickup.pptx
+++ b/powerpoint/pickup.pptx
@@ -6525,6 +6525,33 @@
               <a:buFont typeface="Arial" panose="020B0604020202020204" pitchFamily="34" charset="0"/>
               <a:buChar char="•"/>
             </a:pPr>
+            <a:r>
+              <a:rPr lang="en-US" dirty="0"/>
+              <a:t>Validation Functions</a:t>
+            </a:r>
+          </a:p>
+          <a:p>
+            <a:pPr marL="342900" indent="-342900">
+              <a:buFont typeface="Arial" panose="020B0604020202020204" pitchFamily="34" charset="0"/>
+              <a:buChar char="•"/>
+            </a:pPr>
+            <a:r>
+              <a:rPr lang="en-US" dirty="0"/>
+              <a:t>Vex Modals</a:t>
+            </a:r>
+          </a:p>
+          <a:p>
+            <a:pPr marL="342900" indent="-342900">
+              <a:buFont typeface="Arial" panose="020B0604020202020204" pitchFamily="34" charset="0"/>
+              <a:buChar char="•"/>
+            </a:pPr>
+            <a:endParaRPr lang="en-US" dirty="0"/>
+          </a:p>
+          <a:p>
+            <a:pPr marL="342900" indent="-342900">
+              <a:buFont typeface="Arial" panose="020B0604020202020204" pitchFamily="34" charset="0"/>
+              <a:buChar char="•"/>
+            </a:pPr>
             <a:endParaRPr lang="en-US" dirty="0"/>
           </a:p>
         </p:txBody>
@@ -6683,7 +6710,15 @@
             </a:pPr>
             <a:r>
               <a:rPr lang="en-US" dirty="0"/>
-              <a:t>x</a:t>
+              <a:t>(</a:t>
+            </a:r>
+            <a:r>
+              <a:rPr lang="en-US" dirty="0" err="1"/>
+              <a:t>Heroku</a:t>
+            </a:r>
+            <a:r>
+              <a:rPr lang="en-US" dirty="0"/>
+              <a:t> Link)</a:t>
             </a:r>
           </a:p>
         </p:txBody>

</xml_diff>